<commit_message>
Added the latest Version of the powerpoint.
</commit_message>
<xml_diff>
--- a/Presentations/November 6, 2013/Competition Bridge Tester.pptx
+++ b/Presentations/November 6, 2013/Competition Bridge Tester.pptx
@@ -3237,11 +3237,15 @@
             </a:r>
             <a:r>
               <a:rPr lang="en-US" dirty="0" err="1" smtClean="0"/>
-              <a:t>Trotski</a:t>
+              <a:t>Troitsky</a:t>
             </a:r>
             <a:r>
               <a:rPr lang="en-US" dirty="0" smtClean="0"/>
-              <a:t> Competition</a:t>
+              <a:t> </a:t>
+            </a:r>
+            <a:r>
+              <a:rPr lang="en-US" dirty="0" smtClean="0"/>
+              <a:t>Competition</a:t>
             </a:r>
           </a:p>
           <a:p>
@@ -3352,8 +3356,8 @@
           </a:p>
         </p:txBody>
       </p:sp>
-      <mc:AlternateContent xmlns:mc="http://schemas.openxmlformats.org/markup-compatibility/2006">
-        <mc:Choice xmlns:a14="http://schemas.microsoft.com/office/drawing/2010/main" Requires="a14">
+      <mc:AlternateContent xmlns:mc="http://schemas.openxmlformats.org/markup-compatibility/2006" xmlns:a14="http://schemas.microsoft.com/office/drawing/2010/main">
+        <mc:Choice Requires="a14">
           <p:sp>
             <p:nvSpPr>
               <p:cNvPr id="3" name="Content Placeholder 2"/>
@@ -3742,7 +3746,7 @@
             </p:txBody>
           </p:sp>
         </mc:Choice>
-        <mc:Fallback>
+        <mc:Fallback xmlns="">
           <p:sp>
             <p:nvSpPr>
               <p:cNvPr id="3" name="Content Placeholder 2"/>
@@ -3830,7 +3834,7 @@
           <a:p>
             <a:r>
               <a:rPr lang="en-US" dirty="0" smtClean="0"/>
-              <a:t>Brainstorming</a:t>
+              <a:t>Brainstorming </a:t>
             </a:r>
             <a:endParaRPr lang="en-US" dirty="0"/>
           </a:p>
@@ -3848,10 +3852,208 @@
         </p:nvSpPr>
         <p:spPr/>
         <p:txBody>
-          <a:bodyPr/>
-          <a:lstStyle/>
-          <a:p>
-            <a:endParaRPr lang="en-US"/>
+          <a:bodyPr numCol="2">
+            <a:normAutofit fontScale="85000" lnSpcReduction="20000"/>
+          </a:bodyPr>
+          <a:lstStyle/>
+          <a:p>
+            <a:r>
+              <a:rPr lang="en-US" dirty="0" smtClean="0"/>
+              <a:t>Screen Content</a:t>
+            </a:r>
+          </a:p>
+          <a:p>
+            <a:pPr lvl="1"/>
+            <a:r>
+              <a:rPr lang="en-US" dirty="0" smtClean="0">
+                <a:solidFill>
+                  <a:srgbClr val="00B050"/>
+                </a:solidFill>
+              </a:rPr>
+              <a:t>Current Load</a:t>
+            </a:r>
+          </a:p>
+          <a:p>
+            <a:pPr lvl="1"/>
+            <a:r>
+              <a:rPr lang="en-US" dirty="0" smtClean="0">
+                <a:solidFill>
+                  <a:srgbClr val="00B050"/>
+                </a:solidFill>
+              </a:rPr>
+              <a:t>Max Load</a:t>
+            </a:r>
+          </a:p>
+          <a:p>
+            <a:pPr lvl="1"/>
+            <a:r>
+              <a:rPr lang="en-US" dirty="0" smtClean="0">
+                <a:solidFill>
+                  <a:srgbClr val="00B050"/>
+                </a:solidFill>
+              </a:rPr>
+              <a:t>Stress Over Strain Curve</a:t>
+            </a:r>
+          </a:p>
+          <a:p>
+            <a:r>
+              <a:rPr lang="en-US" dirty="0" smtClean="0"/>
+              <a:t>Display Methods</a:t>
+            </a:r>
+          </a:p>
+          <a:p>
+            <a:pPr lvl="1"/>
+            <a:r>
+              <a:rPr lang="en-US" dirty="0" smtClean="0">
+                <a:solidFill>
+                  <a:srgbClr val="00B050"/>
+                </a:solidFill>
+              </a:rPr>
+              <a:t>Computer Monitor</a:t>
+            </a:r>
+          </a:p>
+          <a:p>
+            <a:pPr lvl="1"/>
+            <a:r>
+              <a:rPr lang="en-US" dirty="0" smtClean="0">
+                <a:solidFill>
+                  <a:srgbClr val="00B050"/>
+                </a:solidFill>
+              </a:rPr>
+              <a:t>7 Segment LED display</a:t>
+            </a:r>
+          </a:p>
+          <a:p>
+            <a:pPr lvl="1"/>
+            <a:r>
+              <a:rPr lang="en-US" dirty="0" smtClean="0">
+                <a:solidFill>
+                  <a:srgbClr val="FF0000"/>
+                </a:solidFill>
+              </a:rPr>
+              <a:t>LED Matrix Display</a:t>
+            </a:r>
+          </a:p>
+          <a:p>
+            <a:pPr lvl="1"/>
+            <a:r>
+              <a:rPr lang="en-US" dirty="0" smtClean="0">
+                <a:solidFill>
+                  <a:srgbClr val="00B050"/>
+                </a:solidFill>
+              </a:rPr>
+              <a:t>Web Page</a:t>
+            </a:r>
+          </a:p>
+          <a:p>
+            <a:endParaRPr lang="en-US" dirty="0" smtClean="0"/>
+          </a:p>
+          <a:p>
+            <a:endParaRPr lang="en-US" dirty="0"/>
+          </a:p>
+          <a:p>
+            <a:r>
+              <a:rPr lang="en-US" dirty="0" smtClean="0"/>
+              <a:t>Piston</a:t>
+            </a:r>
+          </a:p>
+          <a:p>
+            <a:pPr lvl="1"/>
+            <a:r>
+              <a:rPr lang="en-US" dirty="0" smtClean="0">
+                <a:solidFill>
+                  <a:srgbClr val="FF0000"/>
+                </a:solidFill>
+              </a:rPr>
+              <a:t>Pneumatic</a:t>
+            </a:r>
+          </a:p>
+          <a:p>
+            <a:pPr lvl="1"/>
+            <a:r>
+              <a:rPr lang="en-US" dirty="0" smtClean="0">
+                <a:solidFill>
+                  <a:srgbClr val="00B050"/>
+                </a:solidFill>
+              </a:rPr>
+              <a:t>Hydraulic</a:t>
+            </a:r>
+          </a:p>
+          <a:p>
+            <a:r>
+              <a:rPr lang="en-US" dirty="0" smtClean="0"/>
+              <a:t>Force Measurement</a:t>
+            </a:r>
+          </a:p>
+          <a:p>
+            <a:pPr lvl="1"/>
+            <a:r>
+              <a:rPr lang="en-US" dirty="0" smtClean="0">
+                <a:solidFill>
+                  <a:srgbClr val="FF0000"/>
+                </a:solidFill>
+              </a:rPr>
+              <a:t>Load Cell</a:t>
+            </a:r>
+          </a:p>
+          <a:p>
+            <a:pPr lvl="1"/>
+            <a:r>
+              <a:rPr lang="en-US" dirty="0" smtClean="0">
+                <a:solidFill>
+                  <a:srgbClr val="00B050"/>
+                </a:solidFill>
+              </a:rPr>
+              <a:t>Pressure Sensor</a:t>
+            </a:r>
+          </a:p>
+          <a:p>
+            <a:r>
+              <a:rPr lang="en-US" dirty="0" smtClean="0"/>
+              <a:t>Embedded Processor</a:t>
+            </a:r>
+          </a:p>
+          <a:p>
+            <a:pPr lvl="1"/>
+            <a:r>
+              <a:rPr lang="en-US" dirty="0" err="1" smtClean="0">
+                <a:solidFill>
+                  <a:srgbClr val="FF0000"/>
+                </a:solidFill>
+              </a:rPr>
+              <a:t>Arduino</a:t>
+            </a:r>
+            <a:endParaRPr lang="en-US" dirty="0" smtClean="0">
+              <a:solidFill>
+                <a:srgbClr val="FF0000"/>
+              </a:solidFill>
+            </a:endParaRPr>
+          </a:p>
+          <a:p>
+            <a:pPr lvl="1"/>
+            <a:r>
+              <a:rPr lang="en-US" dirty="0" smtClean="0">
+                <a:solidFill>
+                  <a:srgbClr val="FF0000"/>
+                </a:solidFill>
+              </a:rPr>
+              <a:t>Computer</a:t>
+            </a:r>
+          </a:p>
+          <a:p>
+            <a:pPr lvl="1"/>
+            <a:r>
+              <a:rPr lang="en-US" dirty="0" smtClean="0">
+                <a:solidFill>
+                  <a:srgbClr val="00B050"/>
+                </a:solidFill>
+              </a:rPr>
+              <a:t>Raspberry Pi</a:t>
+            </a:r>
+          </a:p>
+          <a:p>
+            <a:pPr lvl="1"/>
+            <a:endParaRPr lang="en-US" dirty="0"/>
           </a:p>
         </p:txBody>
       </p:sp>
@@ -3904,12 +4106,14 @@
         </p:nvSpPr>
         <p:spPr/>
         <p:txBody>
-          <a:bodyPr/>
+          <a:bodyPr>
+            <a:normAutofit fontScale="90000"/>
+          </a:bodyPr>
           <a:lstStyle/>
           <a:p>
             <a:r>
               <a:rPr lang="en-US" dirty="0" smtClean="0"/>
-              <a:t>Tech to use / Research</a:t>
+              <a:t>Technology We Will Need to Research</a:t>
             </a:r>
             <a:endParaRPr lang="en-US" dirty="0"/>
           </a:p>
@@ -3930,7 +4134,34 @@
           <a:bodyPr/>
           <a:lstStyle/>
           <a:p>
-            <a:endParaRPr lang="en-US"/>
+            <a:r>
+              <a:rPr lang="en-US" dirty="0" smtClean="0"/>
+              <a:t>Raspberry Pi</a:t>
+            </a:r>
+          </a:p>
+          <a:p>
+            <a:r>
+              <a:rPr lang="en-US" dirty="0" smtClean="0"/>
+              <a:t>7 Segment Drivers</a:t>
+            </a:r>
+          </a:p>
+          <a:p>
+            <a:r>
+              <a:rPr lang="en-US" dirty="0" smtClean="0"/>
+              <a:t>Hydraulic Systems</a:t>
+            </a:r>
+          </a:p>
+          <a:p>
+            <a:r>
+              <a:rPr lang="en-US" dirty="0" smtClean="0"/>
+              <a:t>Welding</a:t>
+            </a:r>
+          </a:p>
+          <a:p>
+            <a:endParaRPr lang="en-US" dirty="0" smtClean="0"/>
+          </a:p>
+          <a:p>
+            <a:endParaRPr lang="en-US" dirty="0"/>
           </a:p>
         </p:txBody>
       </p:sp>
@@ -4002,7 +4233,40 @@
           <a:bodyPr/>
           <a:lstStyle/>
           <a:p>
-            <a:endParaRPr lang="en-US"/>
+            <a:r>
+              <a:rPr lang="en-US" dirty="0" smtClean="0"/>
+              <a:t>Emailed Gordon Reynolds, John Diebold</a:t>
+            </a:r>
+          </a:p>
+          <a:p>
+            <a:pPr lvl="1"/>
+            <a:r>
+              <a:rPr lang="en-US" dirty="0" smtClean="0"/>
+              <a:t>No Reply</a:t>
+            </a:r>
+          </a:p>
+          <a:p>
+            <a:pPr lvl="1"/>
+            <a:r>
+              <a:rPr lang="en-US" dirty="0" smtClean="0"/>
+              <a:t>Some “Lunch Room” Conversations</a:t>
+            </a:r>
+          </a:p>
+          <a:p>
+            <a:pPr lvl="2"/>
+            <a:r>
+              <a:rPr lang="en-US" dirty="0" smtClean="0"/>
+              <a:t>Result was to look at the </a:t>
+            </a:r>
+            <a:r>
+              <a:rPr lang="en-US" dirty="0" err="1" smtClean="0"/>
+              <a:t>Troitsky</a:t>
+            </a:r>
+            <a:r>
+              <a:rPr lang="en-US" dirty="0" smtClean="0"/>
+              <a:t> Competition</a:t>
+            </a:r>
+            <a:endParaRPr lang="en-US" dirty="0"/>
           </a:p>
         </p:txBody>
       </p:sp>
@@ -4053,7 +4317,11 @@
           <a:p>
             <a:r>
               <a:rPr lang="en-US" dirty="0" smtClean="0"/>
-              <a:t>Research results</a:t>
+              <a:t>Research </a:t>
+            </a:r>
+            <a:r>
+              <a:rPr lang="en-US" dirty="0" smtClean="0"/>
+              <a:t>Results</a:t>
             </a:r>
             <a:endParaRPr lang="en-US" dirty="0"/>
           </a:p>
@@ -4074,7 +4342,56 @@
           <a:bodyPr/>
           <a:lstStyle/>
           <a:p>
-            <a:endParaRPr lang="en-US"/>
+            <a:r>
+              <a:rPr lang="en-US" dirty="0" smtClean="0"/>
+              <a:t>Strain Gauges and Pressure Sensors are ~$500</a:t>
+            </a:r>
+          </a:p>
+          <a:p>
+            <a:pPr lvl="1"/>
+            <a:r>
+              <a:rPr lang="en-US" dirty="0" smtClean="0"/>
+              <a:t>Large Scale Force Measurement is Done by Measuring Pressure in Precision Cylinder</a:t>
+            </a:r>
+          </a:p>
+          <a:p>
+            <a:r>
+              <a:rPr lang="en-US" dirty="0" err="1"/>
+              <a:t>Troitsky</a:t>
+            </a:r>
+            <a:r>
+              <a:rPr lang="en-US" dirty="0"/>
+              <a:t> </a:t>
+            </a:r>
+            <a:r>
+              <a:rPr lang="en-US" dirty="0" smtClean="0"/>
+              <a:t>Competition</a:t>
+            </a:r>
+          </a:p>
+          <a:p>
+            <a:pPr lvl="1"/>
+            <a:r>
+              <a:rPr lang="en-US" dirty="0" smtClean="0"/>
+              <a:t>Current Record Holder is 3.2 Tons. </a:t>
+            </a:r>
+          </a:p>
+          <a:p>
+            <a:pPr lvl="2"/>
+            <a:r>
+              <a:rPr lang="en-US" dirty="0" smtClean="0"/>
+              <a:t>McMaster University</a:t>
+            </a:r>
+          </a:p>
+          <a:p>
+            <a:pPr lvl="1"/>
+            <a:r>
+              <a:rPr lang="en-US" smtClean="0"/>
+              <a:t>Span  is 1 Meter</a:t>
+            </a:r>
+            <a:endParaRPr lang="en-US" dirty="0"/>
+          </a:p>
+          <a:p>
+            <a:endParaRPr lang="en-US" dirty="0" smtClean="0"/>
           </a:p>
         </p:txBody>
       </p:sp>
@@ -4110,6 +4427,63 @@
       </p:grpSpPr>
       <p:sp>
         <p:nvSpPr>
+          <p:cNvPr id="8" name="Rectangle 7"/>
+          <p:cNvSpPr/>
+          <p:nvPr/>
+        </p:nvSpPr>
+        <p:spPr>
+          <a:xfrm>
+            <a:off x="1808204" y="4800600"/>
+            <a:ext cx="4724400" cy="914400"/>
+          </a:xfrm>
+          <a:prstGeom prst="rect">
+            <a:avLst/>
+          </a:prstGeom>
+          <a:solidFill>
+            <a:schemeClr val="bg1">
+              <a:alpha val="0"/>
+            </a:schemeClr>
+          </a:solidFill>
+        </p:spPr>
+        <p:style>
+          <a:lnRef idx="2">
+            <a:schemeClr val="accent1">
+              <a:shade val="50000"/>
+            </a:schemeClr>
+          </a:lnRef>
+          <a:fillRef idx="1">
+            <a:schemeClr val="accent1"/>
+          </a:fillRef>
+          <a:effectRef idx="0">
+            <a:schemeClr val="accent1"/>
+          </a:effectRef>
+          <a:fontRef idx="minor">
+            <a:schemeClr val="lt1"/>
+          </a:fontRef>
+        </p:style>
+        <p:txBody>
+          <a:bodyPr rtlCol="0" anchor="ctr"/>
+          <a:lstStyle/>
+          <a:p>
+            <a:pPr algn="ctr"/>
+            <a:r>
+              <a:rPr lang="en-US" dirty="0" smtClean="0">
+                <a:solidFill>
+                  <a:schemeClr val="tx1"/>
+                </a:solidFill>
+              </a:rPr>
+              <a:t>Lower Truss</a:t>
+            </a:r>
+            <a:endParaRPr lang="en-US" dirty="0">
+              <a:solidFill>
+                <a:schemeClr val="tx1"/>
+              </a:solidFill>
+            </a:endParaRPr>
+          </a:p>
+        </p:txBody>
+      </p:sp>
+      <p:sp>
+        <p:nvSpPr>
           <p:cNvPr id="2" name="Title 1"/>
           <p:cNvSpPr>
             <a:spLocks noGrp="1"/>
@@ -4133,20 +4507,1024 @@
       </p:sp>
       <p:sp>
         <p:nvSpPr>
-          <p:cNvPr id="3" name="Content Placeholder 2"/>
-          <p:cNvSpPr>
-            <a:spLocks noGrp="1"/>
-          </p:cNvSpPr>
-          <p:nvPr>
-            <p:ph idx="1"/>
-          </p:nvPr>
-        </p:nvSpPr>
-        <p:spPr/>
-        <p:txBody>
-          <a:bodyPr/>
-          <a:lstStyle/>
-          <a:p>
-            <a:endParaRPr lang="en-US"/>
+          <p:cNvPr id="4" name="Rectangle 3"/>
+          <p:cNvSpPr/>
+          <p:nvPr/>
+        </p:nvSpPr>
+        <p:spPr>
+          <a:xfrm>
+            <a:off x="1808204" y="1289108"/>
+            <a:ext cx="4724400" cy="914400"/>
+          </a:xfrm>
+          <a:prstGeom prst="rect">
+            <a:avLst/>
+          </a:prstGeom>
+          <a:solidFill>
+            <a:schemeClr val="bg1">
+              <a:alpha val="0"/>
+            </a:schemeClr>
+          </a:solidFill>
+        </p:spPr>
+        <p:style>
+          <a:lnRef idx="2">
+            <a:schemeClr val="accent1">
+              <a:shade val="50000"/>
+            </a:schemeClr>
+          </a:lnRef>
+          <a:fillRef idx="1">
+            <a:schemeClr val="accent1"/>
+          </a:fillRef>
+          <a:effectRef idx="0">
+            <a:schemeClr val="accent1"/>
+          </a:effectRef>
+          <a:fontRef idx="minor">
+            <a:schemeClr val="lt1"/>
+          </a:fontRef>
+        </p:style>
+        <p:txBody>
+          <a:bodyPr rtlCol="0" anchor="ctr"/>
+          <a:lstStyle/>
+          <a:p>
+            <a:pPr algn="ctr"/>
+            <a:r>
+              <a:rPr lang="en-US" dirty="0" smtClean="0">
+                <a:solidFill>
+                  <a:schemeClr val="tx1"/>
+                </a:solidFill>
+              </a:rPr>
+              <a:t>Upper Truss</a:t>
+            </a:r>
+            <a:endParaRPr lang="en-US" dirty="0">
+              <a:solidFill>
+                <a:schemeClr val="tx1"/>
+              </a:solidFill>
+            </a:endParaRPr>
+          </a:p>
+        </p:txBody>
+      </p:sp>
+      <p:sp>
+        <p:nvSpPr>
+          <p:cNvPr id="5" name="Rectangle 4"/>
+          <p:cNvSpPr/>
+          <p:nvPr/>
+        </p:nvSpPr>
+        <p:spPr>
+          <a:xfrm>
+            <a:off x="4900597" y="5029200"/>
+            <a:ext cx="1295400" cy="457200"/>
+          </a:xfrm>
+          <a:prstGeom prst="rect">
+            <a:avLst/>
+          </a:prstGeom>
+        </p:spPr>
+        <p:style>
+          <a:lnRef idx="2">
+            <a:schemeClr val="accent1">
+              <a:shade val="50000"/>
+            </a:schemeClr>
+          </a:lnRef>
+          <a:fillRef idx="1">
+            <a:schemeClr val="accent1"/>
+          </a:fillRef>
+          <a:effectRef idx="0">
+            <a:schemeClr val="accent1"/>
+          </a:effectRef>
+          <a:fontRef idx="minor">
+            <a:schemeClr val="lt1"/>
+          </a:fontRef>
+        </p:style>
+        <p:txBody>
+          <a:bodyPr rtlCol="0" anchor="ctr"/>
+          <a:lstStyle/>
+          <a:p>
+            <a:pPr algn="ctr"/>
+            <a:r>
+              <a:rPr lang="en-US" dirty="0" err="1" smtClean="0"/>
+              <a:t>Rasberry</a:t>
+            </a:r>
+            <a:r>
+              <a:rPr lang="en-US" dirty="0" smtClean="0"/>
+              <a:t> Pi</a:t>
+            </a:r>
+            <a:endParaRPr lang="en-US" dirty="0"/>
+          </a:p>
+        </p:txBody>
+      </p:sp>
+      <p:sp>
+        <p:nvSpPr>
+          <p:cNvPr id="9" name="Rectangle 8"/>
+          <p:cNvSpPr/>
+          <p:nvPr/>
+        </p:nvSpPr>
+        <p:spPr>
+          <a:xfrm rot="5400000">
+            <a:off x="3560803" y="2698922"/>
+            <a:ext cx="1219200" cy="240957"/>
+          </a:xfrm>
+          <a:prstGeom prst="rect">
+            <a:avLst/>
+          </a:prstGeom>
+        </p:spPr>
+        <p:style>
+          <a:lnRef idx="2">
+            <a:schemeClr val="accent1">
+              <a:shade val="50000"/>
+            </a:schemeClr>
+          </a:lnRef>
+          <a:fillRef idx="1">
+            <a:schemeClr val="accent1"/>
+          </a:fillRef>
+          <a:effectRef idx="0">
+            <a:schemeClr val="accent1"/>
+          </a:effectRef>
+          <a:fontRef idx="minor">
+            <a:schemeClr val="lt1"/>
+          </a:fontRef>
+        </p:style>
+        <p:txBody>
+          <a:bodyPr rtlCol="0" anchor="ctr"/>
+          <a:lstStyle/>
+          <a:p>
+            <a:pPr algn="ctr"/>
+            <a:r>
+              <a:rPr lang="en-US" dirty="0" smtClean="0"/>
+              <a:t>Piston</a:t>
+            </a:r>
+            <a:endParaRPr lang="en-US" dirty="0"/>
+          </a:p>
+        </p:txBody>
+      </p:sp>
+      <p:sp>
+        <p:nvSpPr>
+          <p:cNvPr id="10" name="Rectangle 9"/>
+          <p:cNvSpPr/>
+          <p:nvPr/>
+        </p:nvSpPr>
+        <p:spPr>
+          <a:xfrm rot="5400000">
+            <a:off x="5773968" y="4174683"/>
+            <a:ext cx="1010875" cy="240957"/>
+          </a:xfrm>
+          <a:prstGeom prst="rect">
+            <a:avLst/>
+          </a:prstGeom>
+        </p:spPr>
+        <p:style>
+          <a:lnRef idx="2">
+            <a:schemeClr val="accent1">
+              <a:shade val="50000"/>
+            </a:schemeClr>
+          </a:lnRef>
+          <a:fillRef idx="1">
+            <a:schemeClr val="accent1"/>
+          </a:fillRef>
+          <a:effectRef idx="0">
+            <a:schemeClr val="accent1"/>
+          </a:effectRef>
+          <a:fontRef idx="minor">
+            <a:schemeClr val="lt1"/>
+          </a:fontRef>
+        </p:style>
+        <p:txBody>
+          <a:bodyPr rtlCol="0" anchor="ctr"/>
+          <a:lstStyle/>
+          <a:p>
+            <a:pPr algn="ctr"/>
+            <a:r>
+              <a:rPr lang="en-US" dirty="0" smtClean="0"/>
+              <a:t>Support</a:t>
+            </a:r>
+            <a:endParaRPr lang="en-US" dirty="0"/>
+          </a:p>
+        </p:txBody>
+      </p:sp>
+      <p:sp>
+        <p:nvSpPr>
+          <p:cNvPr id="11" name="Rectangle 10"/>
+          <p:cNvSpPr/>
+          <p:nvPr/>
+        </p:nvSpPr>
+        <p:spPr>
+          <a:xfrm rot="5400000">
+            <a:off x="1672441" y="4174684"/>
+            <a:ext cx="1010875" cy="240957"/>
+          </a:xfrm>
+          <a:prstGeom prst="rect">
+            <a:avLst/>
+          </a:prstGeom>
+        </p:spPr>
+        <p:style>
+          <a:lnRef idx="2">
+            <a:schemeClr val="accent1">
+              <a:shade val="50000"/>
+            </a:schemeClr>
+          </a:lnRef>
+          <a:fillRef idx="1">
+            <a:schemeClr val="accent1"/>
+          </a:fillRef>
+          <a:effectRef idx="0">
+            <a:schemeClr val="accent1"/>
+          </a:effectRef>
+          <a:fontRef idx="minor">
+            <a:schemeClr val="lt1"/>
+          </a:fontRef>
+        </p:style>
+        <p:txBody>
+          <a:bodyPr rtlCol="0" anchor="ctr"/>
+          <a:lstStyle/>
+          <a:p>
+            <a:pPr algn="ctr"/>
+            <a:r>
+              <a:rPr lang="en-US" dirty="0" smtClean="0"/>
+              <a:t>Support</a:t>
+            </a:r>
+            <a:endParaRPr lang="en-US" dirty="0"/>
+          </a:p>
+        </p:txBody>
+      </p:sp>
+      <p:sp>
+        <p:nvSpPr>
+          <p:cNvPr id="12" name="Rectangle 11"/>
+          <p:cNvSpPr/>
+          <p:nvPr/>
+        </p:nvSpPr>
+        <p:spPr>
+          <a:xfrm>
+            <a:off x="1810301" y="1309381"/>
+            <a:ext cx="1752600" cy="457200"/>
+          </a:xfrm>
+          <a:prstGeom prst="rect">
+            <a:avLst/>
+          </a:prstGeom>
+        </p:spPr>
+        <p:style>
+          <a:lnRef idx="2">
+            <a:schemeClr val="accent1">
+              <a:shade val="50000"/>
+            </a:schemeClr>
+          </a:lnRef>
+          <a:fillRef idx="1">
+            <a:schemeClr val="accent1"/>
+          </a:fillRef>
+          <a:effectRef idx="0">
+            <a:schemeClr val="accent1"/>
+          </a:effectRef>
+          <a:fontRef idx="minor">
+            <a:schemeClr val="lt1"/>
+          </a:fontRef>
+        </p:style>
+        <p:txBody>
+          <a:bodyPr rtlCol="0" anchor="ctr"/>
+          <a:lstStyle/>
+          <a:p>
+            <a:pPr algn="ctr"/>
+            <a:r>
+              <a:rPr lang="en-US" dirty="0" smtClean="0"/>
+              <a:t>7 Segment Display</a:t>
+            </a:r>
+            <a:endParaRPr lang="en-US" dirty="0"/>
+          </a:p>
+        </p:txBody>
+      </p:sp>
+      <p:sp>
+        <p:nvSpPr>
+          <p:cNvPr id="16" name="Rectangle 15"/>
+          <p:cNvSpPr/>
+          <p:nvPr/>
+        </p:nvSpPr>
+        <p:spPr>
+          <a:xfrm>
+            <a:off x="2038901" y="5047735"/>
+            <a:ext cx="1295400" cy="457200"/>
+          </a:xfrm>
+          <a:prstGeom prst="rect">
+            <a:avLst/>
+          </a:prstGeom>
+        </p:spPr>
+        <p:style>
+          <a:lnRef idx="2">
+            <a:schemeClr val="accent1">
+              <a:shade val="50000"/>
+            </a:schemeClr>
+          </a:lnRef>
+          <a:fillRef idx="1">
+            <a:schemeClr val="accent1"/>
+          </a:fillRef>
+          <a:effectRef idx="0">
+            <a:schemeClr val="accent1"/>
+          </a:effectRef>
+          <a:fontRef idx="minor">
+            <a:schemeClr val="lt1"/>
+          </a:fontRef>
+        </p:style>
+        <p:txBody>
+          <a:bodyPr rtlCol="0" anchor="ctr"/>
+          <a:lstStyle/>
+          <a:p>
+            <a:pPr algn="ctr"/>
+            <a:r>
+              <a:rPr lang="en-US" dirty="0" err="1" smtClean="0"/>
+              <a:t>Hydrolic</a:t>
+            </a:r>
+            <a:r>
+              <a:rPr lang="en-US" dirty="0" smtClean="0"/>
+              <a:t> Pump</a:t>
+            </a:r>
+            <a:endParaRPr lang="en-US" dirty="0"/>
+          </a:p>
+        </p:txBody>
+      </p:sp>
+      <p:sp>
+        <p:nvSpPr>
+          <p:cNvPr id="17" name="Freeform 16"/>
+          <p:cNvSpPr/>
+          <p:nvPr/>
+        </p:nvSpPr>
+        <p:spPr>
+          <a:xfrm>
+            <a:off x="1048596" y="1808598"/>
+            <a:ext cx="3196142" cy="3471856"/>
+          </a:xfrm>
+          <a:custGeom>
+            <a:avLst/>
+            <a:gdLst>
+              <a:gd name="connsiteX0" fmla="*/ 969674 w 3196142"/>
+              <a:gd name="connsiteY0" fmla="*/ 3471856 h 3471856"/>
+              <a:gd name="connsiteX1" fmla="*/ 55274 w 3196142"/>
+              <a:gd name="connsiteY1" fmla="*/ 2705737 h 3471856"/>
+              <a:gd name="connsiteX2" fmla="*/ 327123 w 3196142"/>
+              <a:gd name="connsiteY2" fmla="*/ 176721 h 3471856"/>
+              <a:gd name="connsiteX3" fmla="*/ 2164161 w 3196142"/>
+              <a:gd name="connsiteY3" fmla="*/ 209672 h 3471856"/>
+              <a:gd name="connsiteX4" fmla="*/ 3127988 w 3196142"/>
+              <a:gd name="connsiteY4" fmla="*/ 226148 h 3471856"/>
+              <a:gd name="connsiteX5" fmla="*/ 3127988 w 3196142"/>
+              <a:gd name="connsiteY5" fmla="*/ 390905 h 3471856"/>
+            </a:gdLst>
+            <a:ahLst/>
+            <a:cxnLst>
+              <a:cxn ang="0">
+                <a:pos x="connsiteX0" y="connsiteY0"/>
+              </a:cxn>
+              <a:cxn ang="0">
+                <a:pos x="connsiteX1" y="connsiteY1"/>
+              </a:cxn>
+              <a:cxn ang="0">
+                <a:pos x="connsiteX2" y="connsiteY2"/>
+              </a:cxn>
+              <a:cxn ang="0">
+                <a:pos x="connsiteX3" y="connsiteY3"/>
+              </a:cxn>
+              <a:cxn ang="0">
+                <a:pos x="connsiteX4" y="connsiteY4"/>
+              </a:cxn>
+              <a:cxn ang="0">
+                <a:pos x="connsiteX5" y="connsiteY5"/>
+              </a:cxn>
+            </a:cxnLst>
+            <a:rect l="l" t="t" r="r" b="b"/>
+            <a:pathLst>
+              <a:path w="3196142" h="3471856">
+                <a:moveTo>
+                  <a:pt x="969674" y="3471856"/>
+                </a:moveTo>
+                <a:cubicBezTo>
+                  <a:pt x="566020" y="3363391"/>
+                  <a:pt x="162366" y="3254926"/>
+                  <a:pt x="55274" y="2705737"/>
+                </a:cubicBezTo>
+                <a:cubicBezTo>
+                  <a:pt x="-51818" y="2156548"/>
+                  <a:pt x="-24358" y="592732"/>
+                  <a:pt x="327123" y="176721"/>
+                </a:cubicBezTo>
+                <a:cubicBezTo>
+                  <a:pt x="678604" y="-239290"/>
+                  <a:pt x="2164161" y="209672"/>
+                  <a:pt x="2164161" y="209672"/>
+                </a:cubicBezTo>
+                <a:lnTo>
+                  <a:pt x="3127988" y="226148"/>
+                </a:lnTo>
+                <a:cubicBezTo>
+                  <a:pt x="3288626" y="256353"/>
+                  <a:pt x="3112885" y="315392"/>
+                  <a:pt x="3127988" y="390905"/>
+                </a:cubicBezTo>
+              </a:path>
+            </a:pathLst>
+          </a:custGeom>
+        </p:spPr>
+        <p:style>
+          <a:lnRef idx="2">
+            <a:schemeClr val="accent3"/>
+          </a:lnRef>
+          <a:fillRef idx="0">
+            <a:schemeClr val="accent3"/>
+          </a:fillRef>
+          <a:effectRef idx="1">
+            <a:schemeClr val="accent3"/>
+          </a:effectRef>
+          <a:fontRef idx="minor">
+            <a:schemeClr val="tx1"/>
+          </a:fontRef>
+        </p:style>
+        <p:txBody>
+          <a:bodyPr rtlCol="0" anchor="ctr"/>
+          <a:lstStyle/>
+          <a:p>
+            <a:pPr algn="ctr"/>
+            <a:endParaRPr lang="en-US"/>
+          </a:p>
+        </p:txBody>
+      </p:sp>
+      <p:sp>
+        <p:nvSpPr>
+          <p:cNvPr id="18" name="Rectangle 17"/>
+          <p:cNvSpPr/>
+          <p:nvPr/>
+        </p:nvSpPr>
+        <p:spPr>
+          <a:xfrm>
+            <a:off x="3522704" y="3447536"/>
+            <a:ext cx="1295400" cy="457200"/>
+          </a:xfrm>
+          <a:prstGeom prst="rect">
+            <a:avLst/>
+          </a:prstGeom>
+        </p:spPr>
+        <p:style>
+          <a:lnRef idx="2">
+            <a:schemeClr val="accent1">
+              <a:shade val="50000"/>
+            </a:schemeClr>
+          </a:lnRef>
+          <a:fillRef idx="1">
+            <a:schemeClr val="accent1"/>
+          </a:fillRef>
+          <a:effectRef idx="0">
+            <a:schemeClr val="accent1"/>
+          </a:effectRef>
+          <a:fontRef idx="minor">
+            <a:schemeClr val="lt1"/>
+          </a:fontRef>
+        </p:style>
+        <p:txBody>
+          <a:bodyPr rtlCol="0" anchor="ctr"/>
+          <a:lstStyle/>
+          <a:p>
+            <a:pPr algn="ctr"/>
+            <a:r>
+              <a:rPr lang="en-US" dirty="0" smtClean="0"/>
+              <a:t>Force </a:t>
+            </a:r>
+            <a:r>
+              <a:rPr lang="en-US" dirty="0" err="1" smtClean="0"/>
+              <a:t>Guage</a:t>
+            </a:r>
+            <a:endParaRPr lang="en-US" dirty="0"/>
+          </a:p>
+        </p:txBody>
+      </p:sp>
+      <p:sp>
+        <p:nvSpPr>
+          <p:cNvPr id="19" name="Freeform 18"/>
+          <p:cNvSpPr/>
+          <p:nvPr/>
+        </p:nvSpPr>
+        <p:spPr>
+          <a:xfrm>
+            <a:off x="4507310" y="1719679"/>
+            <a:ext cx="2486332" cy="3847045"/>
+          </a:xfrm>
+          <a:custGeom>
+            <a:avLst/>
+            <a:gdLst>
+              <a:gd name="connsiteX0" fmla="*/ 180020 w 2486332"/>
+              <a:gd name="connsiteY0" fmla="*/ 1731975 h 3847045"/>
+              <a:gd name="connsiteX1" fmla="*/ 196495 w 2486332"/>
+              <a:gd name="connsiteY1" fmla="*/ 397445 h 3847045"/>
+              <a:gd name="connsiteX2" fmla="*/ 2181814 w 2486332"/>
+              <a:gd name="connsiteY2" fmla="*/ 257402 h 3847045"/>
+              <a:gd name="connsiteX3" fmla="*/ 2470139 w 2486332"/>
+              <a:gd name="connsiteY3" fmla="*/ 3618440 h 3847045"/>
+              <a:gd name="connsiteX4" fmla="*/ 2091198 w 2486332"/>
+              <a:gd name="connsiteY4" fmla="*/ 3544299 h 3847045"/>
+              <a:gd name="connsiteX5" fmla="*/ 1712258 w 2486332"/>
+              <a:gd name="connsiteY5" fmla="*/ 3527824 h 3847045"/>
+            </a:gdLst>
+            <a:ahLst/>
+            <a:cxnLst>
+              <a:cxn ang="0">
+                <a:pos x="connsiteX0" y="connsiteY0"/>
+              </a:cxn>
+              <a:cxn ang="0">
+                <a:pos x="connsiteX1" y="connsiteY1"/>
+              </a:cxn>
+              <a:cxn ang="0">
+                <a:pos x="connsiteX2" y="connsiteY2"/>
+              </a:cxn>
+              <a:cxn ang="0">
+                <a:pos x="connsiteX3" y="connsiteY3"/>
+              </a:cxn>
+              <a:cxn ang="0">
+                <a:pos x="connsiteX4" y="connsiteY4"/>
+              </a:cxn>
+              <a:cxn ang="0">
+                <a:pos x="connsiteX5" y="connsiteY5"/>
+              </a:cxn>
+            </a:cxnLst>
+            <a:rect l="l" t="t" r="r" b="b"/>
+            <a:pathLst>
+              <a:path w="2486332" h="3847045">
+                <a:moveTo>
+                  <a:pt x="180020" y="1731975"/>
+                </a:moveTo>
+                <a:cubicBezTo>
+                  <a:pt x="21441" y="1187591"/>
+                  <a:pt x="-137137" y="643207"/>
+                  <a:pt x="196495" y="397445"/>
+                </a:cubicBezTo>
+                <a:cubicBezTo>
+                  <a:pt x="530127" y="151683"/>
+                  <a:pt x="1802873" y="-279431"/>
+                  <a:pt x="2181814" y="257402"/>
+                </a:cubicBezTo>
+                <a:cubicBezTo>
+                  <a:pt x="2560755" y="794234"/>
+                  <a:pt x="2485242" y="3070624"/>
+                  <a:pt x="2470139" y="3618440"/>
+                </a:cubicBezTo>
+                <a:cubicBezTo>
+                  <a:pt x="2455036" y="4166256"/>
+                  <a:pt x="2217511" y="3559402"/>
+                  <a:pt x="2091198" y="3544299"/>
+                </a:cubicBezTo>
+                <a:cubicBezTo>
+                  <a:pt x="1964885" y="3529196"/>
+                  <a:pt x="1796009" y="3438581"/>
+                  <a:pt x="1712258" y="3527824"/>
+                </a:cubicBezTo>
+              </a:path>
+            </a:pathLst>
+          </a:custGeom>
+        </p:spPr>
+        <p:style>
+          <a:lnRef idx="2">
+            <a:schemeClr val="accent2"/>
+          </a:lnRef>
+          <a:fillRef idx="0">
+            <a:schemeClr val="accent2"/>
+          </a:fillRef>
+          <a:effectRef idx="1">
+            <a:schemeClr val="accent2"/>
+          </a:effectRef>
+          <a:fontRef idx="minor">
+            <a:schemeClr val="tx1"/>
+          </a:fontRef>
+        </p:style>
+        <p:txBody>
+          <a:bodyPr rtlCol="0" anchor="ctr"/>
+          <a:lstStyle/>
+          <a:p>
+            <a:pPr algn="ctr"/>
+            <a:endParaRPr lang="en-US"/>
+          </a:p>
+        </p:txBody>
+      </p:sp>
+      <p:sp>
+        <p:nvSpPr>
+          <p:cNvPr id="13" name="Rectangle 12"/>
+          <p:cNvSpPr/>
+          <p:nvPr/>
+        </p:nvSpPr>
+        <p:spPr>
+          <a:xfrm>
+            <a:off x="5109832" y="1295400"/>
+            <a:ext cx="1278168" cy="914400"/>
+          </a:xfrm>
+          <a:prstGeom prst="rect">
+            <a:avLst/>
+          </a:prstGeom>
+        </p:spPr>
+        <p:style>
+          <a:lnRef idx="2">
+            <a:schemeClr val="accent1">
+              <a:shade val="50000"/>
+            </a:schemeClr>
+          </a:lnRef>
+          <a:fillRef idx="1">
+            <a:schemeClr val="accent1"/>
+          </a:fillRef>
+          <a:effectRef idx="0">
+            <a:schemeClr val="accent1"/>
+          </a:effectRef>
+          <a:fontRef idx="minor">
+            <a:schemeClr val="lt1"/>
+          </a:fontRef>
+        </p:style>
+        <p:txBody>
+          <a:bodyPr rtlCol="0" anchor="ctr"/>
+          <a:lstStyle/>
+          <a:p>
+            <a:pPr algn="ctr"/>
+            <a:r>
+              <a:rPr lang="en-US" dirty="0" smtClean="0"/>
+              <a:t>Monitor</a:t>
+            </a:r>
+            <a:endParaRPr lang="en-US" dirty="0"/>
+          </a:p>
+        </p:txBody>
+      </p:sp>
+      <p:sp>
+        <p:nvSpPr>
+          <p:cNvPr id="20" name="Freeform 19"/>
+          <p:cNvSpPr/>
+          <p:nvPr/>
+        </p:nvSpPr>
+        <p:spPr>
+          <a:xfrm>
+            <a:off x="6211330" y="1622854"/>
+            <a:ext cx="1244167" cy="3772500"/>
+          </a:xfrm>
+          <a:custGeom>
+            <a:avLst/>
+            <a:gdLst>
+              <a:gd name="connsiteX0" fmla="*/ 0 w 1244167"/>
+              <a:gd name="connsiteY0" fmla="*/ 3542270 h 3772500"/>
+              <a:gd name="connsiteX1" fmla="*/ 1128584 w 1244167"/>
+              <a:gd name="connsiteY1" fmla="*/ 3468130 h 3772500"/>
+              <a:gd name="connsiteX2" fmla="*/ 1103870 w 1244167"/>
+              <a:gd name="connsiteY2" fmla="*/ 568411 h 3772500"/>
+              <a:gd name="connsiteX3" fmla="*/ 214184 w 1244167"/>
+              <a:gd name="connsiteY3" fmla="*/ 0 h 3772500"/>
+            </a:gdLst>
+            <a:ahLst/>
+            <a:cxnLst>
+              <a:cxn ang="0">
+                <a:pos x="connsiteX0" y="connsiteY0"/>
+              </a:cxn>
+              <a:cxn ang="0">
+                <a:pos x="connsiteX1" y="connsiteY1"/>
+              </a:cxn>
+              <a:cxn ang="0">
+                <a:pos x="connsiteX2" y="connsiteY2"/>
+              </a:cxn>
+              <a:cxn ang="0">
+                <a:pos x="connsiteX3" y="connsiteY3"/>
+              </a:cxn>
+            </a:cxnLst>
+            <a:rect l="l" t="t" r="r" b="b"/>
+            <a:pathLst>
+              <a:path w="1244167" h="3772500">
+                <a:moveTo>
+                  <a:pt x="0" y="3542270"/>
+                </a:moveTo>
+                <a:cubicBezTo>
+                  <a:pt x="472303" y="3753021"/>
+                  <a:pt x="944606" y="3963773"/>
+                  <a:pt x="1128584" y="3468130"/>
+                </a:cubicBezTo>
+                <a:cubicBezTo>
+                  <a:pt x="1312562" y="2972487"/>
+                  <a:pt x="1256270" y="1146433"/>
+                  <a:pt x="1103870" y="568411"/>
+                </a:cubicBezTo>
+                <a:cubicBezTo>
+                  <a:pt x="951470" y="-9611"/>
+                  <a:pt x="373449" y="24713"/>
+                  <a:pt x="214184" y="0"/>
+                </a:cubicBezTo>
+              </a:path>
+            </a:pathLst>
+          </a:custGeom>
+        </p:spPr>
+        <p:style>
+          <a:lnRef idx="2">
+            <a:schemeClr val="accent2"/>
+          </a:lnRef>
+          <a:fillRef idx="0">
+            <a:schemeClr val="accent2"/>
+          </a:fillRef>
+          <a:effectRef idx="1">
+            <a:schemeClr val="accent2"/>
+          </a:effectRef>
+          <a:fontRef idx="minor">
+            <a:schemeClr val="tx1"/>
+          </a:fontRef>
+        </p:style>
+        <p:txBody>
+          <a:bodyPr rtlCol="0" anchor="ctr"/>
+          <a:lstStyle/>
+          <a:p>
+            <a:pPr algn="ctr"/>
+            <a:endParaRPr lang="en-US"/>
+          </a:p>
+        </p:txBody>
+      </p:sp>
+      <p:sp>
+        <p:nvSpPr>
+          <p:cNvPr id="22" name="Freeform 21"/>
+          <p:cNvSpPr/>
+          <p:nvPr/>
+        </p:nvSpPr>
+        <p:spPr>
+          <a:xfrm>
+            <a:off x="5140411" y="971972"/>
+            <a:ext cx="2570801" cy="4412270"/>
+          </a:xfrm>
+          <a:custGeom>
+            <a:avLst/>
+            <a:gdLst>
+              <a:gd name="connsiteX0" fmla="*/ 1112108 w 2570801"/>
+              <a:gd name="connsiteY0" fmla="*/ 4135487 h 4412270"/>
+              <a:gd name="connsiteX1" fmla="*/ 2463113 w 2570801"/>
+              <a:gd name="connsiteY1" fmla="*/ 4011920 h 4412270"/>
+              <a:gd name="connsiteX2" fmla="*/ 2207740 w 2570801"/>
+              <a:gd name="connsiteY2" fmla="*/ 296655 h 4412270"/>
+              <a:gd name="connsiteX3" fmla="*/ 0 w 2570801"/>
+              <a:gd name="connsiteY3" fmla="*/ 255466 h 4412270"/>
+            </a:gdLst>
+            <a:ahLst/>
+            <a:cxnLst>
+              <a:cxn ang="0">
+                <a:pos x="connsiteX0" y="connsiteY0"/>
+              </a:cxn>
+              <a:cxn ang="0">
+                <a:pos x="connsiteX1" y="connsiteY1"/>
+              </a:cxn>
+              <a:cxn ang="0">
+                <a:pos x="connsiteX2" y="connsiteY2"/>
+              </a:cxn>
+              <a:cxn ang="0">
+                <a:pos x="connsiteX3" y="connsiteY3"/>
+              </a:cxn>
+            </a:cxnLst>
+            <a:rect l="l" t="t" r="r" b="b"/>
+            <a:pathLst>
+              <a:path w="2570801" h="4412270">
+                <a:moveTo>
+                  <a:pt x="1112108" y="4135487"/>
+                </a:moveTo>
+                <a:cubicBezTo>
+                  <a:pt x="1696308" y="4393606"/>
+                  <a:pt x="2280508" y="4651725"/>
+                  <a:pt x="2463113" y="4011920"/>
+                </a:cubicBezTo>
+                <a:cubicBezTo>
+                  <a:pt x="2645718" y="3372115"/>
+                  <a:pt x="2618259" y="922731"/>
+                  <a:pt x="2207740" y="296655"/>
+                </a:cubicBezTo>
+                <a:cubicBezTo>
+                  <a:pt x="1797221" y="-329421"/>
+                  <a:pt x="755135" y="225261"/>
+                  <a:pt x="0" y="255466"/>
+                </a:cubicBezTo>
+              </a:path>
+            </a:pathLst>
+          </a:custGeom>
+        </p:spPr>
+        <p:style>
+          <a:lnRef idx="2">
+            <a:schemeClr val="accent2"/>
+          </a:lnRef>
+          <a:fillRef idx="0">
+            <a:schemeClr val="accent2"/>
+          </a:fillRef>
+          <a:effectRef idx="1">
+            <a:schemeClr val="accent2"/>
+          </a:effectRef>
+          <a:fontRef idx="minor">
+            <a:schemeClr val="tx1"/>
+          </a:fontRef>
+        </p:style>
+        <p:txBody>
+          <a:bodyPr rtlCol="0" anchor="ctr"/>
+          <a:lstStyle/>
+          <a:p>
+            <a:pPr algn="ctr"/>
+            <a:endParaRPr lang="en-US"/>
+          </a:p>
+        </p:txBody>
+      </p:sp>
+      <p:sp>
+        <p:nvSpPr>
+          <p:cNvPr id="23" name="Freeform 22"/>
+          <p:cNvSpPr/>
+          <p:nvPr/>
+        </p:nvSpPr>
+        <p:spPr>
+          <a:xfrm>
+            <a:off x="2529016" y="1183147"/>
+            <a:ext cx="2619633" cy="118431"/>
+          </a:xfrm>
+          <a:custGeom>
+            <a:avLst/>
+            <a:gdLst>
+              <a:gd name="connsiteX0" fmla="*/ 2619633 w 2619633"/>
+              <a:gd name="connsiteY0" fmla="*/ 44291 h 118431"/>
+              <a:gd name="connsiteX1" fmla="*/ 601362 w 2619633"/>
+              <a:gd name="connsiteY1" fmla="*/ 3102 h 118431"/>
+              <a:gd name="connsiteX2" fmla="*/ 0 w 2619633"/>
+              <a:gd name="connsiteY2" fmla="*/ 118431 h 118431"/>
+            </a:gdLst>
+            <a:ahLst/>
+            <a:cxnLst>
+              <a:cxn ang="0">
+                <a:pos x="connsiteX0" y="connsiteY0"/>
+              </a:cxn>
+              <a:cxn ang="0">
+                <a:pos x="connsiteX1" y="connsiteY1"/>
+              </a:cxn>
+              <a:cxn ang="0">
+                <a:pos x="connsiteX2" y="connsiteY2"/>
+              </a:cxn>
+            </a:cxnLst>
+            <a:rect l="l" t="t" r="r" b="b"/>
+            <a:pathLst>
+              <a:path w="2619633" h="118431">
+                <a:moveTo>
+                  <a:pt x="2619633" y="44291"/>
+                </a:moveTo>
+                <a:cubicBezTo>
+                  <a:pt x="1828800" y="17518"/>
+                  <a:pt x="1037967" y="-9255"/>
+                  <a:pt x="601362" y="3102"/>
+                </a:cubicBezTo>
+                <a:cubicBezTo>
+                  <a:pt x="164757" y="15459"/>
+                  <a:pt x="85124" y="-16120"/>
+                  <a:pt x="0" y="118431"/>
+                </a:cubicBezTo>
+              </a:path>
+            </a:pathLst>
+          </a:custGeom>
+        </p:spPr>
+        <p:style>
+          <a:lnRef idx="2">
+            <a:schemeClr val="accent2"/>
+          </a:lnRef>
+          <a:fillRef idx="0">
+            <a:schemeClr val="accent2"/>
+          </a:fillRef>
+          <a:effectRef idx="1">
+            <a:schemeClr val="accent2"/>
+          </a:effectRef>
+          <a:fontRef idx="minor">
+            <a:schemeClr val="tx1"/>
+          </a:fontRef>
+        </p:style>
+        <p:txBody>
+          <a:bodyPr rtlCol="0" anchor="ctr"/>
+          <a:lstStyle/>
+          <a:p>
+            <a:pPr algn="ctr"/>
+            <a:endParaRPr lang="en-US"/>
+          </a:p>
+        </p:txBody>
+      </p:sp>
+      <p:sp>
+        <p:nvSpPr>
+          <p:cNvPr id="24" name="Oval 23"/>
+          <p:cNvSpPr/>
+          <p:nvPr/>
+        </p:nvSpPr>
+        <p:spPr>
+          <a:xfrm>
+            <a:off x="1612592" y="5791200"/>
+            <a:ext cx="551899" cy="533400"/>
+          </a:xfrm>
+          <a:prstGeom prst="ellipse">
+            <a:avLst/>
+          </a:prstGeom>
+        </p:spPr>
+        <p:style>
+          <a:lnRef idx="2">
+            <a:schemeClr val="accent1">
+              <a:shade val="50000"/>
+            </a:schemeClr>
+          </a:lnRef>
+          <a:fillRef idx="1">
+            <a:schemeClr val="accent1"/>
+          </a:fillRef>
+          <a:effectRef idx="0">
+            <a:schemeClr val="accent1"/>
+          </a:effectRef>
+          <a:fontRef idx="minor">
+            <a:schemeClr val="lt1"/>
+          </a:fontRef>
+        </p:style>
+        <p:txBody>
+          <a:bodyPr rtlCol="0" anchor="ctr"/>
+          <a:lstStyle/>
+          <a:p>
+            <a:pPr algn="ctr"/>
+            <a:endParaRPr lang="en-US"/>
+          </a:p>
+        </p:txBody>
+      </p:sp>
+      <p:sp>
+        <p:nvSpPr>
+          <p:cNvPr id="25" name="Oval 24"/>
+          <p:cNvSpPr/>
+          <p:nvPr/>
+        </p:nvSpPr>
+        <p:spPr>
+          <a:xfrm>
+            <a:off x="6324749" y="5831359"/>
+            <a:ext cx="551899" cy="533400"/>
+          </a:xfrm>
+          <a:prstGeom prst="ellipse">
+            <a:avLst/>
+          </a:prstGeom>
+        </p:spPr>
+        <p:style>
+          <a:lnRef idx="2">
+            <a:schemeClr val="accent1">
+              <a:shade val="50000"/>
+            </a:schemeClr>
+          </a:lnRef>
+          <a:fillRef idx="1">
+            <a:schemeClr val="accent1"/>
+          </a:fillRef>
+          <a:effectRef idx="0">
+            <a:schemeClr val="accent1"/>
+          </a:effectRef>
+          <a:fontRef idx="minor">
+            <a:schemeClr val="lt1"/>
+          </a:fontRef>
+        </p:style>
+        <p:txBody>
+          <a:bodyPr rtlCol="0" anchor="ctr"/>
+          <a:lstStyle/>
+          <a:p>
+            <a:pPr algn="ctr"/>
+            <a:endParaRPr lang="en-US"/>
+          </a:p>
+        </p:txBody>
+      </p:sp>
+      <p:cxnSp>
+        <p:nvCxnSpPr>
+          <p:cNvPr id="27" name="Straight Arrow Connector 26"/>
+          <p:cNvCxnSpPr/>
+          <p:nvPr/>
+        </p:nvCxnSpPr>
+        <p:spPr>
+          <a:xfrm>
+            <a:off x="2298357" y="6098059"/>
+            <a:ext cx="3860570" cy="0"/>
+          </a:xfrm>
+          <a:prstGeom prst="straightConnector1">
+            <a:avLst/>
+          </a:prstGeom>
+          <a:ln>
+            <a:headEnd type="arrow"/>
+            <a:tailEnd type="arrow"/>
+          </a:ln>
+        </p:spPr>
+        <p:style>
+          <a:lnRef idx="1">
+            <a:schemeClr val="accent1"/>
+          </a:lnRef>
+          <a:fillRef idx="0">
+            <a:schemeClr val="accent1"/>
+          </a:fillRef>
+          <a:effectRef idx="0">
+            <a:schemeClr val="accent1"/>
+          </a:effectRef>
+          <a:fontRef idx="minor">
+            <a:schemeClr val="tx1"/>
+          </a:fontRef>
+        </p:style>
+      </p:cxnSp>
+      <p:sp>
+        <p:nvSpPr>
+          <p:cNvPr id="28" name="TextBox 27"/>
+          <p:cNvSpPr txBox="1"/>
+          <p:nvPr/>
+        </p:nvSpPr>
+        <p:spPr>
+          <a:xfrm>
+            <a:off x="3562901" y="6019800"/>
+            <a:ext cx="885179" cy="369332"/>
+          </a:xfrm>
+          <a:prstGeom prst="rect">
+            <a:avLst/>
+          </a:prstGeom>
+          <a:noFill/>
+        </p:spPr>
+        <p:txBody>
+          <a:bodyPr wrap="none" rtlCol="0">
+            <a:spAutoFit/>
+          </a:bodyPr>
+          <a:lstStyle/>
+          <a:p>
+            <a:r>
+              <a:rPr lang="en-US" dirty="0" smtClean="0"/>
+              <a:t>Wheels</a:t>
+            </a:r>
+            <a:endParaRPr lang="en-US" dirty="0"/>
           </a:p>
         </p:txBody>
       </p:sp>

</xml_diff>